<commit_message>
fix position of '
</commit_message>
<xml_diff>
--- a/img/vote.pptx
+++ b/img/vote.pptx
@@ -151,7 +151,7 @@
       </p14:sectionLst>
     </p:ext>
     <p:ext uri="{EFAFB233-063F-42B5-8137-9DF3F51BA10A}">
-      <p15:sldGuideLst xmlns="" xmlns:p15="http://schemas.microsoft.com/office/powerpoint/2012/main">
+      <p15:sldGuideLst xmlns:p15="http://schemas.microsoft.com/office/powerpoint/2012/main" xmlns="">
         <p15:guide id="1" orient="horz" pos="2160">
           <p15:clr>
             <a:srgbClr val="A4A3A4"/>
@@ -165,7 +165,7 @@
       </p15:sldGuideLst>
     </p:ext>
     <p:ext uri="{2D200454-40CA-4A62-9FC3-DE9A4176ACB9}">
-      <p15:notesGuideLst xmlns="" xmlns:p15="http://schemas.microsoft.com/office/powerpoint/2012/main">
+      <p15:notesGuideLst xmlns:p15="http://schemas.microsoft.com/office/powerpoint/2012/main" xmlns="">
         <p15:guide id="1" orient="horz" pos="3223">
           <p15:clr>
             <a:srgbClr val="A4A3A4"/>
@@ -2050,8 +2050,8 @@
           </a:fontRef>
         </p:style>
       </p:cxnSp>
-      <mc:AlternateContent xmlns:mc="http://schemas.openxmlformats.org/markup-compatibility/2006">
-        <mc:Choice xmlns:a14="http://schemas.microsoft.com/office/drawing/2010/main" Requires="a14">
+      <mc:AlternateContent xmlns:mc="http://schemas.openxmlformats.org/markup-compatibility/2006" xmlns:a14="http://schemas.microsoft.com/office/drawing/2010/main">
+        <mc:Choice Requires="a14">
           <p:sp>
             <p:nvSpPr>
               <p:cNvPr id="20" name="テキスト ボックス 19"/>
@@ -2194,7 +2194,7 @@
             </p:txBody>
           </p:sp>
         </mc:Choice>
-        <mc:Fallback>
+        <mc:Fallback xmlns="">
           <p:sp>
             <p:nvSpPr>
               <p:cNvPr id="20" name="テキスト ボックス 19"/>
@@ -2237,8 +2237,8 @@
           </p:sp>
         </mc:Fallback>
       </mc:AlternateContent>
-      <mc:AlternateContent xmlns:mc="http://schemas.openxmlformats.org/markup-compatibility/2006">
-        <mc:Choice xmlns:a14="http://schemas.microsoft.com/office/drawing/2010/main" Requires="a14">
+      <mc:AlternateContent xmlns:mc="http://schemas.openxmlformats.org/markup-compatibility/2006" xmlns:a14="http://schemas.microsoft.com/office/drawing/2010/main">
+        <mc:Choice Requires="a14">
           <p:sp>
             <p:nvSpPr>
               <p:cNvPr id="30" name="テキスト ボックス 29"/>
@@ -2315,7 +2315,7 @@
             </p:txBody>
           </p:sp>
         </mc:Choice>
-        <mc:Fallback>
+        <mc:Fallback xmlns="">
           <p:sp>
             <p:nvSpPr>
               <p:cNvPr id="30" name="テキスト ボックス 29"/>
@@ -2358,8 +2358,8 @@
           </p:sp>
         </mc:Fallback>
       </mc:AlternateContent>
-      <mc:AlternateContent xmlns:mc="http://schemas.openxmlformats.org/markup-compatibility/2006">
-        <mc:Choice xmlns:a14="http://schemas.microsoft.com/office/drawing/2010/main" Requires="a14">
+      <mc:AlternateContent xmlns:mc="http://schemas.openxmlformats.org/markup-compatibility/2006" xmlns:a14="http://schemas.microsoft.com/office/drawing/2010/main">
+        <mc:Choice Requires="a14">
           <p:sp>
             <p:nvSpPr>
               <p:cNvPr id="31" name="テキスト ボックス 30"/>
@@ -2436,7 +2436,7 @@
             </p:txBody>
           </p:sp>
         </mc:Choice>
-        <mc:Fallback>
+        <mc:Fallback xmlns="">
           <p:sp>
             <p:nvSpPr>
               <p:cNvPr id="31" name="テキスト ボックス 30"/>
@@ -2479,8 +2479,8 @@
           </p:sp>
         </mc:Fallback>
       </mc:AlternateContent>
-      <mc:AlternateContent xmlns:mc="http://schemas.openxmlformats.org/markup-compatibility/2006">
-        <mc:Choice xmlns:a14="http://schemas.microsoft.com/office/drawing/2010/main" Requires="a14">
+      <mc:AlternateContent xmlns:mc="http://schemas.openxmlformats.org/markup-compatibility/2006" xmlns:a14="http://schemas.microsoft.com/office/drawing/2010/main">
+        <mc:Choice Requires="a14">
           <p:sp>
             <p:nvSpPr>
               <p:cNvPr id="32" name="テキスト ボックス 31"/>
@@ -2557,7 +2557,7 @@
             </p:txBody>
           </p:sp>
         </mc:Choice>
-        <mc:Fallback>
+        <mc:Fallback xmlns="">
           <p:sp>
             <p:nvSpPr>
               <p:cNvPr id="32" name="テキスト ボックス 31"/>
@@ -2726,7 +2726,7 @@
             <p:spPr>
               <a:xfrm>
                 <a:off x="2763773" y="1472073"/>
-                <a:ext cx="282147" cy="206125"/>
+                <a:ext cx="249703" cy="205100"/>
               </a:xfrm>
               <a:prstGeom prst="rect">
                 <a:avLst/>
@@ -2750,8 +2750,8 @@
                       <m:jc m:val="centerGroup"/>
                     </m:oMathParaPr>
                     <m:oMath xmlns:m="http://schemas.openxmlformats.org/officeDocument/2006/math">
-                      <m:sSub>
-                        <m:sSubPr>
+                      <m:sSubSup>
+                        <m:sSubSupPr>
                           <m:ctrlPr>
                             <a:rPr lang="en-US" altLang="ja-JP" sz="1050" b="0" i="1" smtClean="0">
                               <a:latin typeface="Cambria Math"/>
@@ -2759,7 +2759,7 @@
                               <a:cs typeface="Courier New" pitchFamily="49" charset="0"/>
                             </a:rPr>
                           </m:ctrlPr>
-                        </m:sSubPr>
+                        </m:sSubSupPr>
                         <m:e>
                           <m:r>
                             <a:rPr lang="en-US" altLang="ja-JP" sz="1050" b="0" i="1" smtClean="0">
@@ -2771,39 +2771,26 @@
                           </m:r>
                         </m:e>
                         <m:sub>
-                          <m:sSup>
-                            <m:sSupPr>
-                              <m:ctrlPr>
-                                <a:rPr lang="en-US" altLang="ja-JP" sz="1050" b="0" i="1" smtClean="0">
-                                  <a:latin typeface="Cambria Math"/>
-                                  <a:ea typeface="HG丸ｺﾞｼｯｸM-PRO" panose="020F0600000000000000" pitchFamily="50" charset="-128"/>
-                                  <a:cs typeface="Courier New" pitchFamily="49" charset="0"/>
-                                </a:rPr>
-                              </m:ctrlPr>
-                            </m:sSupPr>
-                            <m:e>
-                              <m:r>
-                                <a:rPr lang="en-US" altLang="ja-JP" sz="1050" b="0" i="1" smtClean="0">
-                                  <a:latin typeface="Cambria Math"/>
-                                  <a:ea typeface="HG丸ｺﾞｼｯｸM-PRO" panose="020F0600000000000000" pitchFamily="50" charset="-128"/>
-                                  <a:cs typeface="Courier New" pitchFamily="49" charset="0"/>
-                                </a:rPr>
-                                <m:t>1</m:t>
-                              </m:r>
-                            </m:e>
-                            <m:sup>
-                              <m:r>
-                                <a:rPr lang="en-US" altLang="ja-JP" sz="1050" b="0" i="1" smtClean="0">
-                                  <a:latin typeface="Cambria Math"/>
-                                  <a:ea typeface="HG丸ｺﾞｼｯｸM-PRO" panose="020F0600000000000000" pitchFamily="50" charset="-128"/>
-                                  <a:cs typeface="Courier New" pitchFamily="49" charset="0"/>
-                                </a:rPr>
-                                <m:t>′</m:t>
-                              </m:r>
-                            </m:sup>
-                          </m:sSup>
+                          <m:r>
+                            <a:rPr lang="en-US" altLang="ja-JP" sz="1050" b="0" i="1" smtClean="0">
+                              <a:latin typeface="Cambria Math"/>
+                              <a:ea typeface="HG丸ｺﾞｼｯｸM-PRO" panose="020F0600000000000000" pitchFamily="50" charset="-128"/>
+                              <a:cs typeface="Courier New" pitchFamily="49" charset="0"/>
+                            </a:rPr>
+                            <m:t>1</m:t>
+                          </m:r>
                         </m:sub>
-                      </m:sSub>
+                        <m:sup>
+                          <m:r>
+                            <a:rPr lang="en-US" altLang="ja-JP" sz="1050" b="0" i="1" smtClean="0">
+                              <a:latin typeface="Cambria Math"/>
+                              <a:ea typeface="HG丸ｺﾞｼｯｸM-PRO" panose="020F0600000000000000" pitchFamily="50" charset="-128"/>
+                              <a:cs typeface="Courier New" pitchFamily="49" charset="0"/>
+                            </a:rPr>
+                            <m:t>′</m:t>
+                          </m:r>
+                        </m:sup>
+                      </m:sSubSup>
                     </m:oMath>
                   </m:oMathPara>
                 </a14:m>
@@ -2828,7 +2815,7 @@
             <p:spPr>
               <a:xfrm>
                 <a:off x="2763773" y="1472073"/>
-                <a:ext cx="282147" cy="206125"/>
+                <a:ext cx="249703" cy="205100"/>
               </a:xfrm>
               <a:prstGeom prst="rect">
                 <a:avLst/>
@@ -2870,7 +2857,7 @@
             <p:spPr>
               <a:xfrm>
                 <a:off x="3094393" y="1472073"/>
-                <a:ext cx="293881" cy="206125"/>
+                <a:ext cx="252844" cy="205100"/>
               </a:xfrm>
               <a:prstGeom prst="rect">
                 <a:avLst/>
@@ -2894,8 +2881,8 @@
                       <m:jc m:val="centerGroup"/>
                     </m:oMathParaPr>
                     <m:oMath xmlns:m="http://schemas.openxmlformats.org/officeDocument/2006/math">
-                      <m:sSub>
-                        <m:sSubPr>
+                      <m:sSubSup>
+                        <m:sSubSupPr>
                           <m:ctrlPr>
                             <a:rPr lang="en-US" altLang="ja-JP" sz="1050" b="0" i="1" smtClean="0">
                               <a:latin typeface="Cambria Math"/>
@@ -2903,7 +2890,7 @@
                               <a:cs typeface="Courier New" pitchFamily="49" charset="0"/>
                             </a:rPr>
                           </m:ctrlPr>
-                        </m:sSubPr>
+                        </m:sSubSupPr>
                         <m:e>
                           <m:r>
                             <a:rPr lang="en-US" altLang="ja-JP" sz="1050" b="0" i="1" smtClean="0">
@@ -2915,39 +2902,26 @@
                           </m:r>
                         </m:e>
                         <m:sub>
-                          <m:sSup>
-                            <m:sSupPr>
-                              <m:ctrlPr>
-                                <a:rPr lang="en-US" altLang="ja-JP" sz="1050" b="0" i="1" smtClean="0">
-                                  <a:latin typeface="Cambria Math"/>
-                                  <a:ea typeface="HG丸ｺﾞｼｯｸM-PRO" panose="020F0600000000000000" pitchFamily="50" charset="-128"/>
-                                  <a:cs typeface="Courier New" pitchFamily="49" charset="0"/>
-                                </a:rPr>
-                              </m:ctrlPr>
-                            </m:sSupPr>
-                            <m:e>
-                              <m:r>
-                                <a:rPr lang="en-US" altLang="ja-JP" sz="1050" b="0" i="1" smtClean="0">
-                                  <a:latin typeface="Cambria Math"/>
-                                  <a:ea typeface="HG丸ｺﾞｼｯｸM-PRO" panose="020F0600000000000000" pitchFamily="50" charset="-128"/>
-                                  <a:cs typeface="Courier New" pitchFamily="49" charset="0"/>
-                                </a:rPr>
-                                <m:t>2</m:t>
-                              </m:r>
-                            </m:e>
-                            <m:sup>
-                              <m:r>
-                                <a:rPr lang="en-US" altLang="ja-JP" sz="1050" b="0" i="1" smtClean="0">
-                                  <a:latin typeface="Cambria Math"/>
-                                  <a:ea typeface="HG丸ｺﾞｼｯｸM-PRO" panose="020F0600000000000000" pitchFamily="50" charset="-128"/>
-                                  <a:cs typeface="Courier New" pitchFamily="49" charset="0"/>
-                                </a:rPr>
-                                <m:t>′</m:t>
-                              </m:r>
-                            </m:sup>
-                          </m:sSup>
+                          <m:r>
+                            <a:rPr lang="en-US" altLang="ja-JP" sz="1050" b="0" i="1" smtClean="0">
+                              <a:latin typeface="Cambria Math"/>
+                              <a:ea typeface="HG丸ｺﾞｼｯｸM-PRO" panose="020F0600000000000000" pitchFamily="50" charset="-128"/>
+                              <a:cs typeface="Courier New" pitchFamily="49" charset="0"/>
+                            </a:rPr>
+                            <m:t>2</m:t>
+                          </m:r>
                         </m:sub>
-                      </m:sSub>
+                        <m:sup>
+                          <m:r>
+                            <a:rPr lang="en-US" altLang="ja-JP" sz="1050" b="0" i="1" smtClean="0">
+                              <a:latin typeface="Cambria Math"/>
+                              <a:ea typeface="HG丸ｺﾞｼｯｸM-PRO" panose="020F0600000000000000" pitchFamily="50" charset="-128"/>
+                              <a:cs typeface="Courier New" pitchFamily="49" charset="0"/>
+                            </a:rPr>
+                            <m:t>′</m:t>
+                          </m:r>
+                        </m:sup>
+                      </m:sSubSup>
                     </m:oMath>
                   </m:oMathPara>
                 </a14:m>
@@ -2972,7 +2946,7 @@
             <p:spPr>
               <a:xfrm>
                 <a:off x="3094393" y="1472073"/>
-                <a:ext cx="293881" cy="206125"/>
+                <a:ext cx="252844" cy="205100"/>
               </a:xfrm>
               <a:prstGeom prst="rect">
                 <a:avLst/>
@@ -3014,7 +2988,7 @@
             <p:spPr>
               <a:xfrm>
                 <a:off x="3438478" y="1471625"/>
-                <a:ext cx="293881" cy="206960"/>
+                <a:ext cx="252844" cy="205100"/>
               </a:xfrm>
               <a:prstGeom prst="rect">
                 <a:avLst/>
@@ -3038,8 +3012,8 @@
                       <m:jc m:val="centerGroup"/>
                     </m:oMathParaPr>
                     <m:oMath xmlns:m="http://schemas.openxmlformats.org/officeDocument/2006/math">
-                      <m:sSub>
-                        <m:sSubPr>
+                      <m:sSubSup>
+                        <m:sSubSupPr>
                           <m:ctrlPr>
                             <a:rPr lang="en-US" altLang="ja-JP" sz="1050" b="0" i="1" smtClean="0">
                               <a:latin typeface="Cambria Math"/>
@@ -3047,7 +3021,7 @@
                               <a:cs typeface="Courier New" pitchFamily="49" charset="0"/>
                             </a:rPr>
                           </m:ctrlPr>
-                        </m:sSubPr>
+                        </m:sSubSupPr>
                         <m:e>
                           <m:r>
                             <a:rPr lang="en-US" altLang="ja-JP" sz="1050" b="0" i="1" smtClean="0">
@@ -3059,39 +3033,26 @@
                           </m:r>
                         </m:e>
                         <m:sub>
-                          <m:sSup>
-                            <m:sSupPr>
-                              <m:ctrlPr>
-                                <a:rPr lang="en-US" altLang="ja-JP" sz="1050" b="0" i="1" smtClean="0">
-                                  <a:latin typeface="Cambria Math"/>
-                                  <a:ea typeface="HG丸ｺﾞｼｯｸM-PRO" panose="020F0600000000000000" pitchFamily="50" charset="-128"/>
-                                  <a:cs typeface="Courier New" pitchFamily="49" charset="0"/>
-                                </a:rPr>
-                              </m:ctrlPr>
-                            </m:sSupPr>
-                            <m:e>
-                              <m:r>
-                                <a:rPr lang="en-US" altLang="ja-JP" sz="1050" b="0" i="1" smtClean="0">
-                                  <a:latin typeface="Cambria Math"/>
-                                  <a:ea typeface="HG丸ｺﾞｼｯｸM-PRO" panose="020F0600000000000000" pitchFamily="50" charset="-128"/>
-                                  <a:cs typeface="Courier New" pitchFamily="49" charset="0"/>
-                                </a:rPr>
-                                <m:t>3</m:t>
-                              </m:r>
-                            </m:e>
-                            <m:sup>
-                              <m:r>
-                                <a:rPr lang="en-US" altLang="ja-JP" sz="1050" b="0" i="1" smtClean="0">
-                                  <a:latin typeface="Cambria Math"/>
-                                  <a:ea typeface="HG丸ｺﾞｼｯｸM-PRO" panose="020F0600000000000000" pitchFamily="50" charset="-128"/>
-                                  <a:cs typeface="Courier New" pitchFamily="49" charset="0"/>
-                                </a:rPr>
-                                <m:t>′</m:t>
-                              </m:r>
-                            </m:sup>
-                          </m:sSup>
+                          <m:r>
+                            <a:rPr lang="en-US" altLang="ja-JP" sz="1050" b="0" i="1" smtClean="0">
+                              <a:latin typeface="Cambria Math"/>
+                              <a:ea typeface="HG丸ｺﾞｼｯｸM-PRO" panose="020F0600000000000000" pitchFamily="50" charset="-128"/>
+                              <a:cs typeface="Courier New" pitchFamily="49" charset="0"/>
+                            </a:rPr>
+                            <m:t>3</m:t>
+                          </m:r>
                         </m:sub>
-                      </m:sSub>
+                        <m:sup>
+                          <m:r>
+                            <a:rPr lang="en-US" altLang="ja-JP" sz="1050" b="0" i="1" smtClean="0">
+                              <a:latin typeface="Cambria Math"/>
+                              <a:ea typeface="HG丸ｺﾞｼｯｸM-PRO" panose="020F0600000000000000" pitchFamily="50" charset="-128"/>
+                              <a:cs typeface="Courier New" pitchFamily="49" charset="0"/>
+                            </a:rPr>
+                            <m:t>′</m:t>
+                          </m:r>
+                        </m:sup>
+                      </m:sSubSup>
                     </m:oMath>
                   </m:oMathPara>
                 </a14:m>
@@ -3116,7 +3077,7 @@
             <p:spPr>
               <a:xfrm>
                 <a:off x="3438478" y="1471625"/>
-                <a:ext cx="293881" cy="206960"/>
+                <a:ext cx="252844" cy="205100"/>
               </a:xfrm>
               <a:prstGeom prst="rect">
                 <a:avLst/>
@@ -3124,7 +3085,7 @@
               <a:blipFill rotWithShape="1">
                 <a:blip r:embed="rId8"/>
                 <a:stretch>
-                  <a:fillRect b="-5882"/>
+                  <a:fillRect b="-2941"/>
                 </a:stretch>
               </a:blipFill>
               <a:ln w="19050" cap="rnd">
@@ -3158,7 +3119,7 @@
             <p:spPr>
               <a:xfrm>
                 <a:off x="3782564" y="1472073"/>
-                <a:ext cx="288239" cy="206125"/>
+                <a:ext cx="252844" cy="205100"/>
               </a:xfrm>
               <a:prstGeom prst="rect">
                 <a:avLst/>
@@ -3182,8 +3143,8 @@
                       <m:jc m:val="centerGroup"/>
                     </m:oMathParaPr>
                     <m:oMath xmlns:m="http://schemas.openxmlformats.org/officeDocument/2006/math">
-                      <m:sSub>
-                        <m:sSubPr>
+                      <m:sSubSup>
+                        <m:sSubSupPr>
                           <m:ctrlPr>
                             <a:rPr lang="en-US" altLang="ja-JP" sz="1050" b="0" i="1" smtClean="0">
                               <a:latin typeface="Cambria Math"/>
@@ -3191,7 +3152,7 @@
                               <a:cs typeface="Courier New" pitchFamily="49" charset="0"/>
                             </a:rPr>
                           </m:ctrlPr>
-                        </m:sSubPr>
+                        </m:sSubSupPr>
                         <m:e>
                           <m:r>
                             <a:rPr lang="en-US" altLang="ja-JP" sz="1050" b="0" i="1" smtClean="0">
@@ -3203,39 +3164,26 @@
                           </m:r>
                         </m:e>
                         <m:sub>
-                          <m:sSup>
-                            <m:sSupPr>
-                              <m:ctrlPr>
-                                <a:rPr lang="en-US" altLang="ja-JP" sz="1050" b="0" i="1" smtClean="0">
-                                  <a:latin typeface="Cambria Math"/>
-                                  <a:ea typeface="HG丸ｺﾞｼｯｸM-PRO" panose="020F0600000000000000" pitchFamily="50" charset="-128"/>
-                                  <a:cs typeface="Courier New" pitchFamily="49" charset="0"/>
-                                </a:rPr>
-                              </m:ctrlPr>
-                            </m:sSupPr>
-                            <m:e>
-                              <m:r>
-                                <a:rPr lang="en-US" altLang="ja-JP" sz="1050" b="0" i="1" smtClean="0">
-                                  <a:latin typeface="Cambria Math"/>
-                                  <a:ea typeface="HG丸ｺﾞｼｯｸM-PRO" panose="020F0600000000000000" pitchFamily="50" charset="-128"/>
-                                  <a:cs typeface="Courier New" pitchFamily="49" charset="0"/>
-                                </a:rPr>
-                                <m:t>4</m:t>
-                              </m:r>
-                            </m:e>
-                            <m:sup>
-                              <m:r>
-                                <a:rPr lang="en-US" altLang="ja-JP" sz="1050" b="0" i="1" smtClean="0">
-                                  <a:latin typeface="Cambria Math"/>
-                                  <a:ea typeface="HG丸ｺﾞｼｯｸM-PRO" panose="020F0600000000000000" pitchFamily="50" charset="-128"/>
-                                  <a:cs typeface="Courier New" pitchFamily="49" charset="0"/>
-                                </a:rPr>
-                                <m:t>′</m:t>
-                              </m:r>
-                            </m:sup>
-                          </m:sSup>
+                          <m:r>
+                            <a:rPr lang="en-US" altLang="ja-JP" sz="1050" b="0" i="1" smtClean="0">
+                              <a:latin typeface="Cambria Math"/>
+                              <a:ea typeface="HG丸ｺﾞｼｯｸM-PRO" panose="020F0600000000000000" pitchFamily="50" charset="-128"/>
+                              <a:cs typeface="Courier New" pitchFamily="49" charset="0"/>
+                            </a:rPr>
+                            <m:t>4</m:t>
+                          </m:r>
                         </m:sub>
-                      </m:sSub>
+                        <m:sup>
+                          <m:r>
+                            <a:rPr lang="en-US" altLang="ja-JP" sz="1050" b="0" i="1" smtClean="0">
+                              <a:latin typeface="Cambria Math"/>
+                              <a:ea typeface="HG丸ｺﾞｼｯｸM-PRO" panose="020F0600000000000000" pitchFamily="50" charset="-128"/>
+                              <a:cs typeface="Courier New" pitchFamily="49" charset="0"/>
+                            </a:rPr>
+                            <m:t>′</m:t>
+                          </m:r>
+                        </m:sup>
+                      </m:sSubSup>
                     </m:oMath>
                   </m:oMathPara>
                 </a14:m>
@@ -3260,7 +3208,7 @@
             <p:spPr>
               <a:xfrm>
                 <a:off x="3782564" y="1472073"/>
-                <a:ext cx="288239" cy="206125"/>
+                <a:ext cx="252844" cy="205100"/>
               </a:xfrm>
               <a:prstGeom prst="rect">
                 <a:avLst/>
@@ -3301,8 +3249,8 @@
         </p:nvCxnSpPr>
         <p:spPr>
           <a:xfrm flipH="1" flipV="1">
-            <a:off x="2904847" y="1678198"/>
-            <a:ext cx="58150" cy="275755"/>
+            <a:off x="2888625" y="1677173"/>
+            <a:ext cx="74385" cy="276782"/>
           </a:xfrm>
           <a:prstGeom prst="straightConnector1">
             <a:avLst/>
@@ -3340,8 +3288,8 @@
         </p:nvCxnSpPr>
         <p:spPr>
           <a:xfrm flipH="1" flipV="1">
-            <a:off x="3241334" y="1678198"/>
-            <a:ext cx="117963" cy="275754"/>
+            <a:off x="3220815" y="1677173"/>
+            <a:ext cx="138482" cy="276779"/>
           </a:xfrm>
           <a:prstGeom prst="straightConnector1">
             <a:avLst/>
@@ -3378,8 +3326,8 @@
         </p:nvCxnSpPr>
         <p:spPr>
           <a:xfrm flipH="1" flipV="1">
-            <a:off x="3585419" y="1678585"/>
-            <a:ext cx="14608" cy="275367"/>
+            <a:off x="3564900" y="1676725"/>
+            <a:ext cx="35131" cy="277230"/>
           </a:xfrm>
           <a:prstGeom prst="straightConnector1">
             <a:avLst/>
@@ -3416,8 +3364,8 @@
         </p:nvCxnSpPr>
         <p:spPr>
           <a:xfrm flipV="1">
-            <a:off x="3908158" y="1678198"/>
-            <a:ext cx="18526" cy="275755"/>
+            <a:off x="3908161" y="1677173"/>
+            <a:ext cx="825" cy="276782"/>
           </a:xfrm>
           <a:prstGeom prst="straightConnector1">
             <a:avLst/>
@@ -3455,7 +3403,7 @@
             <p:spPr>
               <a:xfrm>
                 <a:off x="2737000" y="1040025"/>
-                <a:ext cx="331840" cy="206125"/>
+                <a:ext cx="302665" cy="205100"/>
               </a:xfrm>
               <a:prstGeom prst="rect">
                 <a:avLst/>
@@ -3479,8 +3427,8 @@
                       <m:jc m:val="centerGroup"/>
                     </m:oMathParaPr>
                     <m:oMath xmlns:m="http://schemas.openxmlformats.org/officeDocument/2006/math">
-                      <m:sSub>
-                        <m:sSubPr>
+                      <m:sSubSup>
+                        <m:sSubSupPr>
                           <m:ctrlPr>
                             <a:rPr lang="en-US" altLang="ja-JP" sz="1050" b="0" i="1" smtClean="0">
                               <a:latin typeface="Cambria Math"/>
@@ -3488,7 +3436,7 @@
                               <a:cs typeface="Courier New" pitchFamily="49" charset="0"/>
                             </a:rPr>
                           </m:ctrlPr>
-                        </m:sSubPr>
+                        </m:sSubSupPr>
                         <m:e>
                           <m:r>
                             <a:rPr lang="en-US" altLang="ja-JP" sz="1050" b="0" i="1" smtClean="0">
@@ -3500,39 +3448,26 @@
                           </m:r>
                         </m:e>
                         <m:sub>
-                          <m:sSup>
-                            <m:sSupPr>
-                              <m:ctrlPr>
-                                <a:rPr lang="en-US" altLang="ja-JP" sz="1050" b="0" i="1" smtClean="0">
-                                  <a:latin typeface="Cambria Math"/>
-                                  <a:ea typeface="HG丸ｺﾞｼｯｸM-PRO" panose="020F0600000000000000" pitchFamily="50" charset="-128"/>
-                                  <a:cs typeface="Courier New" pitchFamily="49" charset="0"/>
-                                </a:rPr>
-                              </m:ctrlPr>
-                            </m:sSupPr>
-                            <m:e>
-                              <m:r>
-                                <a:rPr lang="en-US" altLang="ja-JP" sz="1050" b="0" i="1" smtClean="0">
-                                  <a:latin typeface="Cambria Math"/>
-                                  <a:ea typeface="HG丸ｺﾞｼｯｸM-PRO" panose="020F0600000000000000" pitchFamily="50" charset="-128"/>
-                                  <a:cs typeface="Courier New" pitchFamily="49" charset="0"/>
-                                </a:rPr>
-                                <m:t>1</m:t>
-                              </m:r>
-                            </m:e>
-                            <m:sup>
-                              <m:r>
-                                <a:rPr lang="en-US" altLang="ja-JP" sz="1050" b="0" i="1" smtClean="0">
-                                  <a:latin typeface="Cambria Math"/>
-                                  <a:ea typeface="HG丸ｺﾞｼｯｸM-PRO" panose="020F0600000000000000" pitchFamily="50" charset="-128"/>
-                                  <a:cs typeface="Courier New" pitchFamily="49" charset="0"/>
-                                </a:rPr>
-                                <m:t>′</m:t>
-                              </m:r>
-                            </m:sup>
-                          </m:sSup>
+                          <m:r>
+                            <a:rPr lang="en-US" altLang="ja-JP" sz="1050" b="0" i="1" smtClean="0">
+                              <a:latin typeface="Cambria Math"/>
+                              <a:ea typeface="HG丸ｺﾞｼｯｸM-PRO" panose="020F0600000000000000" pitchFamily="50" charset="-128"/>
+                              <a:cs typeface="Courier New" pitchFamily="49" charset="0"/>
+                            </a:rPr>
+                            <m:t>1</m:t>
+                          </m:r>
                         </m:sub>
-                      </m:sSub>
+                        <m:sup>
+                          <m:r>
+                            <a:rPr lang="en-US" altLang="ja-JP" sz="1050" b="0" i="1" smtClean="0">
+                              <a:latin typeface="Cambria Math"/>
+                              <a:ea typeface="HG丸ｺﾞｼｯｸM-PRO" panose="020F0600000000000000" pitchFamily="50" charset="-128"/>
+                              <a:cs typeface="Courier New" pitchFamily="49" charset="0"/>
+                            </a:rPr>
+                            <m:t>′</m:t>
+                          </m:r>
+                        </m:sup>
+                      </m:sSubSup>
                     </m:oMath>
                   </m:oMathPara>
                 </a14:m>
@@ -3557,7 +3492,7 @@
             <p:spPr>
               <a:xfrm>
                 <a:off x="2737000" y="1040025"/>
-                <a:ext cx="331840" cy="206125"/>
+                <a:ext cx="302665" cy="205100"/>
               </a:xfrm>
               <a:prstGeom prst="rect">
                 <a:avLst/>
@@ -3599,7 +3534,7 @@
             <p:spPr>
               <a:xfrm>
                 <a:off x="3067620" y="1040025"/>
-                <a:ext cx="343574" cy="206125"/>
+                <a:ext cx="305808" cy="205100"/>
               </a:xfrm>
               <a:prstGeom prst="rect">
                 <a:avLst/>
@@ -3623,8 +3558,8 @@
                       <m:jc m:val="centerGroup"/>
                     </m:oMathParaPr>
                     <m:oMath xmlns:m="http://schemas.openxmlformats.org/officeDocument/2006/math">
-                      <m:sSub>
-                        <m:sSubPr>
+                      <m:sSubSup>
+                        <m:sSubSupPr>
                           <m:ctrlPr>
                             <a:rPr lang="en-US" altLang="ja-JP" sz="1050" b="0" i="1" smtClean="0">
                               <a:latin typeface="Cambria Math"/>
@@ -3632,7 +3567,7 @@
                               <a:cs typeface="Courier New" pitchFamily="49" charset="0"/>
                             </a:rPr>
                           </m:ctrlPr>
-                        </m:sSubPr>
+                        </m:sSubSupPr>
                         <m:e>
                           <m:r>
                             <a:rPr lang="en-US" altLang="ja-JP" sz="1050" b="0" i="1" smtClean="0">
@@ -3644,39 +3579,26 @@
                           </m:r>
                         </m:e>
                         <m:sub>
-                          <m:sSup>
-                            <m:sSupPr>
-                              <m:ctrlPr>
-                                <a:rPr lang="en-US" altLang="ja-JP" sz="1050" b="0" i="1" smtClean="0">
-                                  <a:latin typeface="Cambria Math"/>
-                                  <a:ea typeface="HG丸ｺﾞｼｯｸM-PRO" panose="020F0600000000000000" pitchFamily="50" charset="-128"/>
-                                  <a:cs typeface="Courier New" pitchFamily="49" charset="0"/>
-                                </a:rPr>
-                              </m:ctrlPr>
-                            </m:sSupPr>
-                            <m:e>
-                              <m:r>
-                                <a:rPr lang="en-US" altLang="ja-JP" sz="1050" b="0" i="1" smtClean="0">
-                                  <a:latin typeface="Cambria Math"/>
-                                  <a:ea typeface="HG丸ｺﾞｼｯｸM-PRO" panose="020F0600000000000000" pitchFamily="50" charset="-128"/>
-                                  <a:cs typeface="Courier New" pitchFamily="49" charset="0"/>
-                                </a:rPr>
-                                <m:t>2</m:t>
-                              </m:r>
-                            </m:e>
-                            <m:sup>
-                              <m:r>
-                                <a:rPr lang="en-US" altLang="ja-JP" sz="1050" b="0" i="1" smtClean="0">
-                                  <a:latin typeface="Cambria Math"/>
-                                  <a:ea typeface="HG丸ｺﾞｼｯｸM-PRO" panose="020F0600000000000000" pitchFamily="50" charset="-128"/>
-                                  <a:cs typeface="Courier New" pitchFamily="49" charset="0"/>
-                                </a:rPr>
-                                <m:t>′</m:t>
-                              </m:r>
-                            </m:sup>
-                          </m:sSup>
+                          <m:r>
+                            <a:rPr lang="en-US" altLang="ja-JP" sz="1050" b="0" i="1" smtClean="0">
+                              <a:latin typeface="Cambria Math"/>
+                              <a:ea typeface="HG丸ｺﾞｼｯｸM-PRO" panose="020F0600000000000000" pitchFamily="50" charset="-128"/>
+                              <a:cs typeface="Courier New" pitchFamily="49" charset="0"/>
+                            </a:rPr>
+                            <m:t>2</m:t>
+                          </m:r>
                         </m:sub>
-                      </m:sSub>
+                        <m:sup>
+                          <m:r>
+                            <a:rPr lang="en-US" altLang="ja-JP" sz="1050" b="0" i="1" smtClean="0">
+                              <a:latin typeface="Cambria Math"/>
+                              <a:ea typeface="HG丸ｺﾞｼｯｸM-PRO" panose="020F0600000000000000" pitchFamily="50" charset="-128"/>
+                              <a:cs typeface="Courier New" pitchFamily="49" charset="0"/>
+                            </a:rPr>
+                            <m:t>′</m:t>
+                          </m:r>
+                        </m:sup>
+                      </m:sSubSup>
                     </m:oMath>
                   </m:oMathPara>
                 </a14:m>
@@ -3701,7 +3623,7 @@
             <p:spPr>
               <a:xfrm>
                 <a:off x="3067620" y="1040025"/>
-                <a:ext cx="343574" cy="206125"/>
+                <a:ext cx="305808" cy="205100"/>
               </a:xfrm>
               <a:prstGeom prst="rect">
                 <a:avLst/>
@@ -3743,7 +3665,7 @@
             <p:spPr>
               <a:xfrm>
                 <a:off x="3401886" y="1039577"/>
-                <a:ext cx="343574" cy="206960"/>
+                <a:ext cx="305808" cy="205100"/>
               </a:xfrm>
               <a:prstGeom prst="rect">
                 <a:avLst/>
@@ -3767,8 +3689,8 @@
                       <m:jc m:val="centerGroup"/>
                     </m:oMathParaPr>
                     <m:oMath xmlns:m="http://schemas.openxmlformats.org/officeDocument/2006/math">
-                      <m:sSub>
-                        <m:sSubPr>
+                      <m:sSubSup>
+                        <m:sSubSupPr>
                           <m:ctrlPr>
                             <a:rPr lang="en-US" altLang="ja-JP" sz="1050" b="0" i="1" smtClean="0">
                               <a:latin typeface="Cambria Math"/>
@@ -3776,7 +3698,7 @@
                               <a:cs typeface="Courier New" pitchFamily="49" charset="0"/>
                             </a:rPr>
                           </m:ctrlPr>
-                        </m:sSubPr>
+                        </m:sSubSupPr>
                         <m:e>
                           <m:r>
                             <a:rPr lang="en-US" altLang="ja-JP" sz="1050" b="0" i="1" smtClean="0">
@@ -3788,39 +3710,26 @@
                           </m:r>
                         </m:e>
                         <m:sub>
-                          <m:sSup>
-                            <m:sSupPr>
-                              <m:ctrlPr>
-                                <a:rPr lang="en-US" altLang="ja-JP" sz="1050" b="0" i="1" smtClean="0">
-                                  <a:latin typeface="Cambria Math"/>
-                                  <a:ea typeface="HG丸ｺﾞｼｯｸM-PRO" panose="020F0600000000000000" pitchFamily="50" charset="-128"/>
-                                  <a:cs typeface="Courier New" pitchFamily="49" charset="0"/>
-                                </a:rPr>
-                              </m:ctrlPr>
-                            </m:sSupPr>
-                            <m:e>
-                              <m:r>
-                                <a:rPr lang="en-US" altLang="ja-JP" sz="1050" b="0" i="1" smtClean="0">
-                                  <a:latin typeface="Cambria Math"/>
-                                  <a:ea typeface="HG丸ｺﾞｼｯｸM-PRO" panose="020F0600000000000000" pitchFamily="50" charset="-128"/>
-                                  <a:cs typeface="Courier New" pitchFamily="49" charset="0"/>
-                                </a:rPr>
-                                <m:t>3</m:t>
-                              </m:r>
-                            </m:e>
-                            <m:sup>
-                              <m:r>
-                                <a:rPr lang="en-US" altLang="ja-JP" sz="1050" b="0" i="1" smtClean="0">
-                                  <a:latin typeface="Cambria Math"/>
-                                  <a:ea typeface="HG丸ｺﾞｼｯｸM-PRO" panose="020F0600000000000000" pitchFamily="50" charset="-128"/>
-                                  <a:cs typeface="Courier New" pitchFamily="49" charset="0"/>
-                                </a:rPr>
-                                <m:t>′</m:t>
-                              </m:r>
-                            </m:sup>
-                          </m:sSup>
+                          <m:r>
+                            <a:rPr lang="en-US" altLang="ja-JP" sz="1050" b="0" i="1" smtClean="0">
+                              <a:latin typeface="Cambria Math"/>
+                              <a:ea typeface="HG丸ｺﾞｼｯｸM-PRO" panose="020F0600000000000000" pitchFamily="50" charset="-128"/>
+                              <a:cs typeface="Courier New" pitchFamily="49" charset="0"/>
+                            </a:rPr>
+                            <m:t>3</m:t>
+                          </m:r>
                         </m:sub>
-                      </m:sSub>
+                        <m:sup>
+                          <m:r>
+                            <a:rPr lang="en-US" altLang="ja-JP" sz="1050" b="0" i="1" smtClean="0">
+                              <a:latin typeface="Cambria Math"/>
+                              <a:ea typeface="HG丸ｺﾞｼｯｸM-PRO" panose="020F0600000000000000" pitchFamily="50" charset="-128"/>
+                              <a:cs typeface="Courier New" pitchFamily="49" charset="0"/>
+                            </a:rPr>
+                            <m:t>′</m:t>
+                          </m:r>
+                        </m:sup>
+                      </m:sSubSup>
                     </m:oMath>
                   </m:oMathPara>
                 </a14:m>
@@ -3845,7 +3754,7 @@
             <p:spPr>
               <a:xfrm>
                 <a:off x="3401886" y="1039577"/>
-                <a:ext cx="343574" cy="206960"/>
+                <a:ext cx="305808" cy="205100"/>
               </a:xfrm>
               <a:prstGeom prst="rect">
                 <a:avLst/>
@@ -3853,7 +3762,7 @@
               <a:blipFill rotWithShape="1">
                 <a:blip r:embed="rId12"/>
                 <a:stretch>
-                  <a:fillRect b="-9091"/>
+                  <a:fillRect b="-6061"/>
                 </a:stretch>
               </a:blipFill>
               <a:ln w="19050" cap="rnd">
@@ -3887,7 +3796,7 @@
             <p:spPr>
               <a:xfrm>
                 <a:off x="3755791" y="1040025"/>
-                <a:ext cx="341202" cy="206125"/>
+                <a:ext cx="305808" cy="205100"/>
               </a:xfrm>
               <a:prstGeom prst="rect">
                 <a:avLst/>
@@ -3911,8 +3820,8 @@
                       <m:jc m:val="centerGroup"/>
                     </m:oMathParaPr>
                     <m:oMath xmlns:m="http://schemas.openxmlformats.org/officeDocument/2006/math">
-                      <m:sSub>
-                        <m:sSubPr>
+                      <m:sSubSup>
+                        <m:sSubSupPr>
                           <m:ctrlPr>
                             <a:rPr lang="en-US" altLang="ja-JP" sz="1050" b="0" i="1" smtClean="0">
                               <a:latin typeface="Cambria Math"/>
@@ -3920,7 +3829,7 @@
                               <a:cs typeface="Courier New" pitchFamily="49" charset="0"/>
                             </a:rPr>
                           </m:ctrlPr>
-                        </m:sSubPr>
+                        </m:sSubSupPr>
                         <m:e>
                           <m:r>
                             <a:rPr lang="en-US" altLang="ja-JP" sz="1050" b="0" i="1" smtClean="0">
@@ -3932,39 +3841,26 @@
                           </m:r>
                         </m:e>
                         <m:sub>
-                          <m:sSup>
-                            <m:sSupPr>
-                              <m:ctrlPr>
-                                <a:rPr lang="en-US" altLang="ja-JP" sz="1050" b="0" i="1" smtClean="0">
-                                  <a:latin typeface="Cambria Math"/>
-                                  <a:ea typeface="HG丸ｺﾞｼｯｸM-PRO" panose="020F0600000000000000" pitchFamily="50" charset="-128"/>
-                                  <a:cs typeface="Courier New" pitchFamily="49" charset="0"/>
-                                </a:rPr>
-                              </m:ctrlPr>
-                            </m:sSupPr>
-                            <m:e>
-                              <m:r>
-                                <a:rPr lang="en-US" altLang="ja-JP" sz="1050" b="0" i="1" smtClean="0">
-                                  <a:latin typeface="Cambria Math"/>
-                                  <a:ea typeface="HG丸ｺﾞｼｯｸM-PRO" panose="020F0600000000000000" pitchFamily="50" charset="-128"/>
-                                  <a:cs typeface="Courier New" pitchFamily="49" charset="0"/>
-                                </a:rPr>
-                                <m:t>4</m:t>
-                              </m:r>
-                            </m:e>
-                            <m:sup>
-                              <m:r>
-                                <a:rPr lang="en-US" altLang="ja-JP" sz="1050" b="0" i="1" smtClean="0">
-                                  <a:latin typeface="Cambria Math"/>
-                                  <a:ea typeface="HG丸ｺﾞｼｯｸM-PRO" panose="020F0600000000000000" pitchFamily="50" charset="-128"/>
-                                  <a:cs typeface="Courier New" pitchFamily="49" charset="0"/>
-                                </a:rPr>
-                                <m:t>′</m:t>
-                              </m:r>
-                            </m:sup>
-                          </m:sSup>
+                          <m:r>
+                            <a:rPr lang="en-US" altLang="ja-JP" sz="1050" b="0" i="1" smtClean="0">
+                              <a:latin typeface="Cambria Math"/>
+                              <a:ea typeface="HG丸ｺﾞｼｯｸM-PRO" panose="020F0600000000000000" pitchFamily="50" charset="-128"/>
+                              <a:cs typeface="Courier New" pitchFamily="49" charset="0"/>
+                            </a:rPr>
+                            <m:t>4</m:t>
+                          </m:r>
                         </m:sub>
-                      </m:sSub>
+                        <m:sup>
+                          <m:r>
+                            <a:rPr lang="en-US" altLang="ja-JP" sz="1050" b="0" i="1" smtClean="0">
+                              <a:latin typeface="Cambria Math"/>
+                              <a:ea typeface="HG丸ｺﾞｼｯｸM-PRO" panose="020F0600000000000000" pitchFamily="50" charset="-128"/>
+                              <a:cs typeface="Courier New" pitchFamily="49" charset="0"/>
+                            </a:rPr>
+                            <m:t>′</m:t>
+                          </m:r>
+                        </m:sup>
+                      </m:sSubSup>
                     </m:oMath>
                   </m:oMathPara>
                 </a14:m>
@@ -3989,7 +3885,7 @@
             <p:spPr>
               <a:xfrm>
                 <a:off x="3755791" y="1040025"/>
-                <a:ext cx="341202" cy="206125"/>
+                <a:ext cx="305808" cy="205100"/>
               </a:xfrm>
               <a:prstGeom prst="rect">
                 <a:avLst/>
@@ -4031,8 +3927,8 @@
         </p:nvCxnSpPr>
         <p:spPr>
           <a:xfrm flipH="1" flipV="1">
-            <a:off x="2902920" y="1246150"/>
-            <a:ext cx="1927" cy="225923"/>
+            <a:off x="2888333" y="1245125"/>
+            <a:ext cx="292" cy="226948"/>
           </a:xfrm>
           <a:prstGeom prst="straightConnector1">
             <a:avLst/>
@@ -4070,8 +3966,8 @@
         </p:nvCxnSpPr>
         <p:spPr>
           <a:xfrm flipH="1" flipV="1">
-            <a:off x="3239407" y="1246150"/>
-            <a:ext cx="1927" cy="225923"/>
+            <a:off x="3220524" y="1245125"/>
+            <a:ext cx="291" cy="226948"/>
           </a:xfrm>
           <a:prstGeom prst="straightConnector1">
             <a:avLst/>
@@ -4109,8 +4005,8 @@
         </p:nvCxnSpPr>
         <p:spPr>
           <a:xfrm flipH="1" flipV="1">
-            <a:off x="3573673" y="1246537"/>
-            <a:ext cx="11746" cy="225088"/>
+            <a:off x="3554790" y="1244677"/>
+            <a:ext cx="10110" cy="226948"/>
           </a:xfrm>
           <a:prstGeom prst="straightConnector1">
             <a:avLst/>
@@ -4148,8 +4044,8 @@
         </p:nvCxnSpPr>
         <p:spPr>
           <a:xfrm flipH="1" flipV="1">
-            <a:off x="3926392" y="1246150"/>
-            <a:ext cx="292" cy="225923"/>
+            <a:off x="3908695" y="1245125"/>
+            <a:ext cx="291" cy="226948"/>
           </a:xfrm>
           <a:prstGeom prst="straightConnector1">
             <a:avLst/>
@@ -4249,8 +4145,8 @@
         </p:nvCxnSpPr>
         <p:spPr>
           <a:xfrm flipV="1">
-            <a:off x="2902920" y="837829"/>
-            <a:ext cx="204071" cy="202196"/>
+            <a:off x="2888333" y="837829"/>
+            <a:ext cx="218658" cy="202196"/>
           </a:xfrm>
           <a:prstGeom prst="straightConnector1">
             <a:avLst/>
@@ -4287,8 +4183,8 @@
         </p:nvCxnSpPr>
         <p:spPr>
           <a:xfrm flipV="1">
-            <a:off x="3239407" y="837829"/>
-            <a:ext cx="68875" cy="202196"/>
+            <a:off x="3220524" y="837829"/>
+            <a:ext cx="87759" cy="202196"/>
           </a:xfrm>
           <a:prstGeom prst="straightConnector1">
             <a:avLst/>
@@ -4325,8 +4221,8 @@
         </p:nvCxnSpPr>
         <p:spPr>
           <a:xfrm flipV="1">
-            <a:off x="3573673" y="837829"/>
-            <a:ext cx="26354" cy="201748"/>
+            <a:off x="3554790" y="837829"/>
+            <a:ext cx="45237" cy="201748"/>
           </a:xfrm>
           <a:prstGeom prst="straightConnector1">
             <a:avLst/>
@@ -4363,8 +4259,8 @@
         </p:nvCxnSpPr>
         <p:spPr>
           <a:xfrm flipH="1" flipV="1">
-            <a:off x="3870177" y="837829"/>
-            <a:ext cx="56215" cy="202196"/>
+            <a:off x="3870184" y="837829"/>
+            <a:ext cx="38511" cy="202196"/>
           </a:xfrm>
           <a:prstGeom prst="straightConnector1">
             <a:avLst/>
@@ -4725,8 +4621,8 @@
           </a:p>
         </p:txBody>
       </p:sp>
-      <mc:AlternateContent xmlns:mc="http://schemas.openxmlformats.org/markup-compatibility/2006">
-        <mc:Choice xmlns:a14="http://schemas.microsoft.com/office/drawing/2010/main" Requires="a14">
+      <mc:AlternateContent xmlns:mc="http://schemas.openxmlformats.org/markup-compatibility/2006" xmlns:a14="http://schemas.microsoft.com/office/drawing/2010/main">
+        <mc:Choice Requires="a14">
           <p:sp>
             <p:nvSpPr>
               <p:cNvPr id="43" name="テキスト ボックス 42"/>
@@ -4803,7 +4699,7 @@
             </p:txBody>
           </p:sp>
         </mc:Choice>
-        <mc:Fallback>
+        <mc:Fallback xmlns="">
           <p:sp>
             <p:nvSpPr>
               <p:cNvPr id="43" name="テキスト ボックス 42"/>
@@ -5044,8 +4940,8 @@
           </a:p>
         </p:txBody>
       </p:sp>
-      <mc:AlternateContent xmlns:mc="http://schemas.openxmlformats.org/markup-compatibility/2006">
-        <mc:Choice xmlns:a14="http://schemas.microsoft.com/office/drawing/2010/main" Requires="a14">
+      <mc:AlternateContent xmlns:mc="http://schemas.openxmlformats.org/markup-compatibility/2006" xmlns:a14="http://schemas.microsoft.com/office/drawing/2010/main">
+        <mc:Choice Requires="a14">
           <p:sp>
             <p:nvSpPr>
               <p:cNvPr id="57" name="テキスト ボックス 56"/>
@@ -5122,7 +5018,7 @@
             </p:txBody>
           </p:sp>
         </mc:Choice>
-        <mc:Fallback>
+        <mc:Fallback xmlns="">
           <p:sp>
             <p:nvSpPr>
               <p:cNvPr id="57" name="テキスト ボックス 56"/>
@@ -5539,8 +5435,8 @@
           </a:fontRef>
         </p:style>
       </p:cxnSp>
-      <mc:AlternateContent xmlns:mc="http://schemas.openxmlformats.org/markup-compatibility/2006">
-        <mc:Choice xmlns:a14="http://schemas.microsoft.com/office/drawing/2010/main" Requires="a14">
+      <mc:AlternateContent xmlns:mc="http://schemas.openxmlformats.org/markup-compatibility/2006" xmlns:a14="http://schemas.microsoft.com/office/drawing/2010/main">
+        <mc:Choice Requires="a14">
           <p:sp>
             <p:nvSpPr>
               <p:cNvPr id="85" name="テキスト ボックス 84"/>
@@ -5617,7 +5513,7 @@
             </p:txBody>
           </p:sp>
         </mc:Choice>
-        <mc:Fallback>
+        <mc:Fallback xmlns="">
           <p:sp>
             <p:nvSpPr>
               <p:cNvPr id="85" name="テキスト ボックス 84"/>
@@ -6217,8 +6113,8 @@
           </p:txBody>
         </p:sp>
       </p:grpSp>
-      <mc:AlternateContent xmlns:mc="http://schemas.openxmlformats.org/markup-compatibility/2006">
-        <mc:Choice xmlns:a14="http://schemas.microsoft.com/office/drawing/2010/main" Requires="a14">
+      <mc:AlternateContent xmlns:mc="http://schemas.openxmlformats.org/markup-compatibility/2006" xmlns:a14="http://schemas.microsoft.com/office/drawing/2010/main">
+        <mc:Choice Requires="a14">
           <p:sp>
             <p:nvSpPr>
               <p:cNvPr id="92" name="テキスト ボックス 91"/>
@@ -6295,7 +6191,7 @@
             </p:txBody>
           </p:sp>
         </mc:Choice>
-        <mc:Fallback>
+        <mc:Fallback xmlns="">
           <p:sp>
             <p:nvSpPr>
               <p:cNvPr id="92" name="テキスト ボックス 91"/>
@@ -6338,8 +6234,8 @@
           </p:sp>
         </mc:Fallback>
       </mc:AlternateContent>
-      <mc:AlternateContent xmlns:mc="http://schemas.openxmlformats.org/markup-compatibility/2006">
-        <mc:Choice xmlns:a14="http://schemas.microsoft.com/office/drawing/2010/main" Requires="a14">
+      <mc:AlternateContent xmlns:mc="http://schemas.openxmlformats.org/markup-compatibility/2006" xmlns:a14="http://schemas.microsoft.com/office/drawing/2010/main">
+        <mc:Choice Requires="a14">
           <p:sp>
             <p:nvSpPr>
               <p:cNvPr id="93" name="テキスト ボックス 92"/>
@@ -6416,7 +6312,7 @@
             </p:txBody>
           </p:sp>
         </mc:Choice>
-        <mc:Fallback>
+        <mc:Fallback xmlns="">
           <p:sp>
             <p:nvSpPr>
               <p:cNvPr id="93" name="テキスト ボックス 92"/>
@@ -6459,8 +6355,8 @@
           </p:sp>
         </mc:Fallback>
       </mc:AlternateContent>
-      <mc:AlternateContent xmlns:mc="http://schemas.openxmlformats.org/markup-compatibility/2006">
-        <mc:Choice xmlns:a14="http://schemas.microsoft.com/office/drawing/2010/main" Requires="a14">
+      <mc:AlternateContent xmlns:mc="http://schemas.openxmlformats.org/markup-compatibility/2006" xmlns:a14="http://schemas.microsoft.com/office/drawing/2010/main">
+        <mc:Choice Requires="a14">
           <p:sp>
             <p:nvSpPr>
               <p:cNvPr id="94" name="テキスト ボックス 93"/>
@@ -6537,7 +6433,7 @@
             </p:txBody>
           </p:sp>
         </mc:Choice>
-        <mc:Fallback>
+        <mc:Fallback xmlns="">
           <p:sp>
             <p:nvSpPr>
               <p:cNvPr id="94" name="テキスト ボックス 93"/>

</xml_diff>